<commit_message>
Add Dmytro's part to poster.
</commit_message>
<xml_diff>
--- a/poster.pptx
+++ b/poster.pptx
@@ -255,7 +255,7 @@
           <a:p>
             <a:fld id="{A61186C1-2136-4F5C-81C5-7E7D5B4818E4}" type="datetimeFigureOut">
               <a:rPr lang="en-US" smtClean="0"/>
-              <a:t>4/10/2016</a:t>
+              <a:t>4/11/16</a:t>
             </a:fld>
             <a:endParaRPr lang="en-US"/>
           </a:p>
@@ -437,7 +437,7 @@
               <a:pPr>
                 <a:defRPr/>
               </a:pPr>
-              <a:t>4/10/2016</a:t>
+              <a:t>4/11/16</a:t>
             </a:fld>
             <a:endParaRPr lang="en-US"/>
           </a:p>
@@ -1562,8 +1562,8 @@
         </p:nvSpPr>
         <p:spPr bwMode="auto">
           <a:xfrm>
-            <a:off x="15801448" y="4199579"/>
-            <a:ext cx="12432742" cy="5858822"/>
+            <a:off x="15801448" y="4199578"/>
+            <a:ext cx="12432742" cy="6012395"/>
           </a:xfrm>
           <a:prstGeom prst="roundRect">
             <a:avLst>
@@ -1612,6 +1612,43 @@
           <a:p>
             <a:pPr algn="just"/>
             <a:endParaRPr lang="en-US" sz="2363" b="1" dirty="0"/>
+          </a:p>
+          <a:p>
+            <a:pPr algn="just"/>
+            <a:endParaRPr lang="en-US" sz="2025" dirty="0">
+              <a:latin typeface="+mn-lt"/>
+            </a:endParaRPr>
+          </a:p>
+          <a:p>
+            <a:pPr algn="just"/>
+            <a:endParaRPr lang="en-US" sz="2081" dirty="0"/>
+          </a:p>
+          <a:p>
+            <a:pPr algn="just"/>
+            <a:endParaRPr lang="en-US" sz="2081" dirty="0"/>
+          </a:p>
+          <a:p>
+            <a:pPr algn="just"/>
+            <a:endParaRPr lang="en-US" sz="2081" dirty="0"/>
+          </a:p>
+          <a:p>
+            <a:pPr algn="just"/>
+            <a:endParaRPr lang="en-US" sz="2081" dirty="0"/>
+          </a:p>
+          <a:p>
+            <a:pPr algn="just"/>
+            <a:endParaRPr lang="en-US" sz="2081" dirty="0"/>
+          </a:p>
+          <a:p>
+            <a:pPr algn="just"/>
+            <a:endParaRPr lang="en-US" sz="2081" b="1" dirty="0"/>
+          </a:p>
+          <a:p>
+            <a:pPr lvl="1" algn="just"/>
+            <a:r>
+              <a:rPr lang="en-US" sz="2081" b="1" dirty="0"/>
+              <a:t> </a:t>
+            </a:r>
           </a:p>
           <a:p>
             <a:pPr lvl="1" algn="just"/>
@@ -1799,7 +1836,7 @@
         <p:spPr bwMode="auto">
           <a:xfrm>
             <a:off x="29908147" y="11813598"/>
-            <a:ext cx="12014811" cy="4188872"/>
+            <a:ext cx="12994468" cy="7680632"/>
           </a:xfrm>
           <a:prstGeom prst="roundRect">
             <a:avLst>
@@ -1853,8 +1890,8 @@
         </p:nvSpPr>
         <p:spPr bwMode="auto">
           <a:xfrm>
-            <a:off x="29800798" y="21761827"/>
-            <a:ext cx="12014811" cy="5302815"/>
+            <a:off x="30006665" y="26062529"/>
+            <a:ext cx="12895949" cy="5302815"/>
           </a:xfrm>
           <a:prstGeom prst="roundRect">
             <a:avLst>
@@ -1914,8 +1951,8 @@
         </p:nvSpPr>
         <p:spPr bwMode="auto">
           <a:xfrm>
-            <a:off x="29800797" y="16103558"/>
-            <a:ext cx="12014812" cy="5608393"/>
+            <a:off x="30006663" y="20052987"/>
+            <a:ext cx="12895951" cy="5608393"/>
           </a:xfrm>
           <a:prstGeom prst="roundRect">
             <a:avLst>
@@ -2257,67 +2294,6 @@
           </a:p>
         </p:txBody>
       </p:sp>
-      <p:sp>
-        <p:nvSpPr>
-          <p:cNvPr id="32" name="AutoShape 38"/>
-          <p:cNvSpPr>
-            <a:spLocks noChangeArrowheads="1"/>
-          </p:cNvSpPr>
-          <p:nvPr/>
-        </p:nvSpPr>
-        <p:spPr bwMode="auto">
-          <a:xfrm>
-            <a:off x="29945236" y="27171810"/>
-            <a:ext cx="12014811" cy="5302815"/>
-          </a:xfrm>
-          <a:prstGeom prst="roundRect">
-            <a:avLst>
-              <a:gd name="adj" fmla="val 16667"/>
-            </a:avLst>
-          </a:prstGeom>
-          <a:solidFill>
-            <a:schemeClr val="bg1"/>
-          </a:solidFill>
-          <a:ln w="9525">
-            <a:solidFill>
-              <a:schemeClr val="tx1"/>
-            </a:solidFill>
-            <a:round/>
-            <a:headEnd/>
-            <a:tailEnd/>
-          </a:ln>
-          <a:effectLst/>
-          <a:extLst>
-            <a:ext uri="{AF507438-7753-43E0-B8FC-AC1667EBCBE1}">
-              <a14:hiddenEffects xmlns:a14="http://schemas.microsoft.com/office/drawing/2010/main">
-                <a:effectLst>
-                  <a:outerShdw dist="35921" dir="2700000" algn="ctr" rotWithShape="0">
-                    <a:schemeClr val="bg2"/>
-                  </a:outerShdw>
-                </a:effectLst>
-              </a14:hiddenEffects>
-            </a:ext>
-          </a:extLst>
-        </p:spPr>
-        <p:txBody>
-          <a:bodyPr lIns="67508" tIns="33754" rIns="67508" bIns="33754" anchor="t"/>
-          <a:lstStyle/>
-          <a:p>
-            <a:pPr algn="ctr"/>
-            <a:r>
-              <a:rPr lang="en-US" sz="4400" b="1" dirty="0" smtClean="0"/>
-              <a:t>Motivation</a:t>
-            </a:r>
-            <a:endParaRPr lang="en-US" sz="4400" b="1" dirty="0"/>
-          </a:p>
-          <a:p>
-            <a:pPr algn="ctr"/>
-            <a:endParaRPr lang="en-US" sz="2251" dirty="0">
-              <a:latin typeface="Times New Roman" pitchFamily="18" charset="0"/>
-            </a:endParaRPr>
-          </a:p>
-        </p:txBody>
-      </p:sp>
       <p:pic>
         <p:nvPicPr>
           <p:cNvPr id="16" name="Picture 15"/>
@@ -2511,6 +2487,987 @@
           </a:prstGeom>
         </p:spPr>
       </p:pic>
+      <p:graphicFrame>
+        <p:nvGraphicFramePr>
+          <p:cNvPr id="3" name="Table 2"/>
+          <p:cNvGraphicFramePr>
+            <a:graphicFrameLocks noGrp="1"/>
+          </p:cNvGraphicFramePr>
+          <p:nvPr>
+            <p:extLst>
+              <p:ext uri="{D42A27DB-BD31-4B8C-83A1-F6EECF244321}">
+                <p14:modId xmlns:p14="http://schemas.microsoft.com/office/powerpoint/2010/main" val="509684405"/>
+              </p:ext>
+            </p:extLst>
+          </p:nvPr>
+        </p:nvGraphicFramePr>
+        <p:xfrm>
+          <a:off x="1892378" y="13603810"/>
+          <a:ext cx="11891952" cy="3808222"/>
+        </p:xfrm>
+        <a:graphic>
+          <a:graphicData uri="http://schemas.openxmlformats.org/drawingml/2006/table">
+            <a:tbl>
+              <a:tblPr firstRow="1" bandRow="1">
+                <a:tableStyleId>{5C22544A-7EE6-4342-B048-85BDC9FD1C3A}</a:tableStyleId>
+              </a:tblPr>
+              <a:tblGrid>
+                <a:gridCol w="2285922"/>
+                <a:gridCol w="4495800"/>
+                <a:gridCol w="5110230"/>
+              </a:tblGrid>
+              <a:tr h="370840">
+                <a:tc>
+                  <a:txBody>
+                    <a:bodyPr/>
+                    <a:lstStyle/>
+                    <a:p>
+                      <a:pPr algn="ctr"/>
+                      <a:r>
+                        <a:rPr lang="en-US" dirty="0" smtClean="0"/>
+                        <a:t>Name</a:t>
+                      </a:r>
+                      <a:endParaRPr lang="en-US" dirty="0"/>
+                    </a:p>
+                  </a:txBody>
+                  <a:tcPr anchor="ctr"/>
+                </a:tc>
+                <a:tc>
+                  <a:txBody>
+                    <a:bodyPr/>
+                    <a:lstStyle/>
+                    <a:p>
+                      <a:pPr algn="ctr"/>
+                      <a:r>
+                        <a:rPr lang="en-US" dirty="0" smtClean="0"/>
+                        <a:t>Type</a:t>
+                      </a:r>
+                      <a:endParaRPr lang="en-US" dirty="0"/>
+                    </a:p>
+                  </a:txBody>
+                  <a:tcPr anchor="ctr"/>
+                </a:tc>
+                <a:tc>
+                  <a:txBody>
+                    <a:bodyPr/>
+                    <a:lstStyle/>
+                    <a:p>
+                      <a:pPr algn="ctr"/>
+                      <a:r>
+                        <a:rPr lang="en-US" dirty="0" smtClean="0"/>
+                        <a:t>Comment</a:t>
+                      </a:r>
+                      <a:endParaRPr lang="en-US" dirty="0"/>
+                    </a:p>
+                  </a:txBody>
+                  <a:tcPr anchor="ctr"/>
+                </a:tc>
+              </a:tr>
+              <a:tr h="370840">
+                <a:tc>
+                  <a:txBody>
+                    <a:bodyPr/>
+                    <a:lstStyle/>
+                    <a:p>
+                      <a:pPr marL="0" marR="0" indent="0" algn="ctr" defTabSz="1234544" rtl="0" eaLnBrk="1" fontAlgn="auto" latinLnBrk="0" hangingPunct="1">
+                        <a:lnSpc>
+                          <a:spcPct val="100000"/>
+                        </a:lnSpc>
+                        <a:spcBef>
+                          <a:spcPts val="0"/>
+                        </a:spcBef>
+                        <a:spcAft>
+                          <a:spcPts val="0"/>
+                        </a:spcAft>
+                        <a:buClrTx/>
+                        <a:buSzTx/>
+                        <a:buFontTx/>
+                        <a:buNone/>
+                        <a:tabLst/>
+                        <a:defRPr/>
+                      </a:pPr>
+                      <a:r>
+                        <a:rPr lang="en-US" sz="4894" kern="1200" dirty="0" smtClean="0">
+                          <a:solidFill>
+                            <a:schemeClr val="dk1"/>
+                          </a:solidFill>
+                          <a:effectLst/>
+                          <a:latin typeface="+mn-lt"/>
+                          <a:ea typeface="+mn-ea"/>
+                          <a:cs typeface="+mn-cs"/>
+                        </a:rPr>
+                        <a:t>Id</a:t>
+                      </a:r>
+                    </a:p>
+                  </a:txBody>
+                  <a:tcPr anchor="ctr"/>
+                </a:tc>
+                <a:tc>
+                  <a:txBody>
+                    <a:bodyPr/>
+                    <a:lstStyle/>
+                    <a:p>
+                      <a:pPr marL="0" marR="0" indent="0" algn="ctr" defTabSz="1234544" rtl="0" eaLnBrk="1" fontAlgn="auto" latinLnBrk="0" hangingPunct="1">
+                        <a:lnSpc>
+                          <a:spcPct val="100000"/>
+                        </a:lnSpc>
+                        <a:spcBef>
+                          <a:spcPts val="0"/>
+                        </a:spcBef>
+                        <a:spcAft>
+                          <a:spcPts val="0"/>
+                        </a:spcAft>
+                        <a:buClrTx/>
+                        <a:buSzTx/>
+                        <a:buFontTx/>
+                        <a:buNone/>
+                        <a:tabLst/>
+                        <a:defRPr/>
+                      </a:pPr>
+                      <a:r>
+                        <a:rPr lang="en-US" sz="4400" i="1" kern="1200" dirty="0" smtClean="0">
+                          <a:solidFill>
+                            <a:schemeClr val="dk1"/>
+                          </a:solidFill>
+                          <a:effectLst/>
+                          <a:latin typeface="+mn-lt"/>
+                          <a:ea typeface="+mn-ea"/>
+                          <a:cs typeface="+mn-cs"/>
+                        </a:rPr>
+                        <a:t>INT </a:t>
+                      </a:r>
+                      <a:endParaRPr lang="en-US" sz="4400" i="1" dirty="0" smtClean="0"/>
+                    </a:p>
+                  </a:txBody>
+                  <a:tcPr anchor="ctr"/>
+                </a:tc>
+                <a:tc>
+                  <a:txBody>
+                    <a:bodyPr/>
+                    <a:lstStyle/>
+                    <a:p>
+                      <a:pPr marL="0" marR="0" indent="0" algn="ctr" defTabSz="1234544" rtl="0" eaLnBrk="1" fontAlgn="auto" latinLnBrk="0" hangingPunct="1">
+                        <a:lnSpc>
+                          <a:spcPct val="100000"/>
+                        </a:lnSpc>
+                        <a:spcBef>
+                          <a:spcPts val="0"/>
+                        </a:spcBef>
+                        <a:spcAft>
+                          <a:spcPts val="0"/>
+                        </a:spcAft>
+                        <a:buClrTx/>
+                        <a:buSzTx/>
+                        <a:buFontTx/>
+                        <a:buNone/>
+                        <a:tabLst/>
+                        <a:defRPr/>
+                      </a:pPr>
+                      <a:r>
+                        <a:rPr lang="en-US" sz="3200" kern="1200" dirty="0" smtClean="0">
+                          <a:solidFill>
+                            <a:schemeClr val="dk1"/>
+                          </a:solidFill>
+                          <a:effectLst/>
+                          <a:latin typeface="+mn-lt"/>
+                          <a:ea typeface="+mn-ea"/>
+                          <a:cs typeface="+mn-cs"/>
+                        </a:rPr>
+                        <a:t>Unique auto-incremented identifier</a:t>
+                      </a:r>
+                      <a:endParaRPr lang="en-US" sz="3200" dirty="0" smtClean="0"/>
+                    </a:p>
+                  </a:txBody>
+                  <a:tcPr anchor="ctr"/>
+                </a:tc>
+              </a:tr>
+              <a:tr h="370840">
+                <a:tc>
+                  <a:txBody>
+                    <a:bodyPr/>
+                    <a:lstStyle/>
+                    <a:p>
+                      <a:pPr algn="ctr"/>
+                      <a:r>
+                        <a:rPr lang="en-US" sz="4894" kern="1200" dirty="0" smtClean="0">
+                          <a:solidFill>
+                            <a:schemeClr val="dk1"/>
+                          </a:solidFill>
+                          <a:effectLst/>
+                          <a:latin typeface="+mn-lt"/>
+                          <a:ea typeface="+mn-ea"/>
+                          <a:cs typeface="+mn-cs"/>
+                        </a:rPr>
+                        <a:t>Name </a:t>
+                      </a:r>
+                      <a:endParaRPr lang="en-US" dirty="0"/>
+                    </a:p>
+                  </a:txBody>
+                  <a:tcPr anchor="ctr"/>
+                </a:tc>
+                <a:tc>
+                  <a:txBody>
+                    <a:bodyPr/>
+                    <a:lstStyle/>
+                    <a:p>
+                      <a:pPr marL="0" marR="0" indent="0" algn="ctr" defTabSz="1234544" rtl="0" eaLnBrk="1" fontAlgn="auto" latinLnBrk="0" hangingPunct="1">
+                        <a:lnSpc>
+                          <a:spcPct val="100000"/>
+                        </a:lnSpc>
+                        <a:spcBef>
+                          <a:spcPts val="0"/>
+                        </a:spcBef>
+                        <a:spcAft>
+                          <a:spcPts val="0"/>
+                        </a:spcAft>
+                        <a:buClrTx/>
+                        <a:buSzTx/>
+                        <a:buFontTx/>
+                        <a:buNone/>
+                        <a:tabLst/>
+                        <a:defRPr/>
+                      </a:pPr>
+                      <a:r>
+                        <a:rPr lang="en-US" sz="4400" i="1" kern="1200" dirty="0" smtClean="0">
+                          <a:solidFill>
+                            <a:schemeClr val="dk1"/>
+                          </a:solidFill>
+                          <a:effectLst/>
+                          <a:latin typeface="+mn-lt"/>
+                          <a:ea typeface="+mn-ea"/>
+                          <a:cs typeface="+mn-cs"/>
+                        </a:rPr>
+                        <a:t>VARCHAR </a:t>
+                      </a:r>
+                      <a:endParaRPr lang="en-US" sz="4400" i="1" dirty="0" smtClean="0"/>
+                    </a:p>
+                  </a:txBody>
+                  <a:tcPr anchor="ctr"/>
+                </a:tc>
+                <a:tc>
+                  <a:txBody>
+                    <a:bodyPr/>
+                    <a:lstStyle/>
+                    <a:p>
+                      <a:pPr marL="0" marR="0" indent="0" algn="ctr" defTabSz="1234544" rtl="0" eaLnBrk="1" fontAlgn="auto" latinLnBrk="0" hangingPunct="1">
+                        <a:lnSpc>
+                          <a:spcPct val="100000"/>
+                        </a:lnSpc>
+                        <a:spcBef>
+                          <a:spcPts val="0"/>
+                        </a:spcBef>
+                        <a:spcAft>
+                          <a:spcPts val="0"/>
+                        </a:spcAft>
+                        <a:buClrTx/>
+                        <a:buSzTx/>
+                        <a:buFontTx/>
+                        <a:buNone/>
+                        <a:tabLst/>
+                        <a:defRPr/>
+                      </a:pPr>
+                      <a:r>
+                        <a:rPr lang="en-US" sz="3200" kern="1200" dirty="0" smtClean="0">
+                          <a:solidFill>
+                            <a:schemeClr val="dk1"/>
+                          </a:solidFill>
+                          <a:effectLst/>
+                          <a:latin typeface="+mn-lt"/>
+                          <a:ea typeface="+mn-ea"/>
+                          <a:cs typeface="+mn-cs"/>
+                        </a:rPr>
+                        <a:t>API user’s name</a:t>
+                      </a:r>
+                    </a:p>
+                  </a:txBody>
+                  <a:tcPr anchor="ctr"/>
+                </a:tc>
+              </a:tr>
+              <a:tr h="370840">
+                <a:tc>
+                  <a:txBody>
+                    <a:bodyPr/>
+                    <a:lstStyle/>
+                    <a:p>
+                      <a:pPr marL="0" marR="0" indent="0" algn="ctr" defTabSz="1234544" rtl="0" eaLnBrk="1" fontAlgn="auto" latinLnBrk="0" hangingPunct="1">
+                        <a:lnSpc>
+                          <a:spcPct val="100000"/>
+                        </a:lnSpc>
+                        <a:spcBef>
+                          <a:spcPts val="0"/>
+                        </a:spcBef>
+                        <a:spcAft>
+                          <a:spcPts val="0"/>
+                        </a:spcAft>
+                        <a:buClrTx/>
+                        <a:buSzTx/>
+                        <a:buFontTx/>
+                        <a:buNone/>
+                        <a:tabLst/>
+                        <a:defRPr/>
+                      </a:pPr>
+                      <a:r>
+                        <a:rPr lang="en-US" sz="4894" kern="1200" dirty="0" err="1" smtClean="0">
+                          <a:solidFill>
+                            <a:schemeClr val="dk1"/>
+                          </a:solidFill>
+                          <a:effectLst/>
+                          <a:latin typeface="+mn-lt"/>
+                          <a:ea typeface="+mn-ea"/>
+                          <a:cs typeface="+mn-cs"/>
+                        </a:rPr>
+                        <a:t>ApiKey</a:t>
+                      </a:r>
+                      <a:r>
+                        <a:rPr lang="en-US" sz="4894" kern="1200" dirty="0" smtClean="0">
+                          <a:solidFill>
+                            <a:schemeClr val="dk1"/>
+                          </a:solidFill>
+                          <a:effectLst/>
+                          <a:latin typeface="+mn-lt"/>
+                          <a:ea typeface="+mn-ea"/>
+                          <a:cs typeface="+mn-cs"/>
+                        </a:rPr>
+                        <a:t> </a:t>
+                      </a:r>
+                      <a:endParaRPr lang="en-US" dirty="0" smtClean="0"/>
+                    </a:p>
+                  </a:txBody>
+                  <a:tcPr anchor="ctr"/>
+                </a:tc>
+                <a:tc>
+                  <a:txBody>
+                    <a:bodyPr/>
+                    <a:lstStyle/>
+                    <a:p>
+                      <a:pPr marL="0" marR="0" indent="0" algn="ctr" defTabSz="1234544" rtl="0" eaLnBrk="1" fontAlgn="auto" latinLnBrk="0" hangingPunct="1">
+                        <a:lnSpc>
+                          <a:spcPct val="100000"/>
+                        </a:lnSpc>
+                        <a:spcBef>
+                          <a:spcPts val="0"/>
+                        </a:spcBef>
+                        <a:spcAft>
+                          <a:spcPts val="0"/>
+                        </a:spcAft>
+                        <a:buClrTx/>
+                        <a:buSzTx/>
+                        <a:buFontTx/>
+                        <a:buNone/>
+                        <a:tabLst/>
+                        <a:defRPr/>
+                      </a:pPr>
+                      <a:r>
+                        <a:rPr lang="is-IS" sz="4400" i="1" kern="1200" dirty="0" smtClean="0">
+                          <a:solidFill>
+                            <a:schemeClr val="dk1"/>
+                          </a:solidFill>
+                          <a:effectLst/>
+                          <a:latin typeface="+mn-lt"/>
+                          <a:ea typeface="+mn-ea"/>
+                          <a:cs typeface="+mn-cs"/>
+                        </a:rPr>
+                        <a:t>VARCHAR(160) </a:t>
+                      </a:r>
+                      <a:endParaRPr lang="is-IS" sz="4400" i="1" dirty="0" smtClean="0"/>
+                    </a:p>
+                  </a:txBody>
+                  <a:tcPr anchor="ctr"/>
+                </a:tc>
+                <a:tc>
+                  <a:txBody>
+                    <a:bodyPr/>
+                    <a:lstStyle/>
+                    <a:p>
+                      <a:pPr marL="0" marR="0" indent="0" algn="ctr" defTabSz="1234544" rtl="0" eaLnBrk="1" fontAlgn="auto" latinLnBrk="0" hangingPunct="1">
+                        <a:lnSpc>
+                          <a:spcPct val="100000"/>
+                        </a:lnSpc>
+                        <a:spcBef>
+                          <a:spcPts val="0"/>
+                        </a:spcBef>
+                        <a:spcAft>
+                          <a:spcPts val="0"/>
+                        </a:spcAft>
+                        <a:buClrTx/>
+                        <a:buSzTx/>
+                        <a:buFontTx/>
+                        <a:buNone/>
+                        <a:tabLst/>
+                        <a:defRPr/>
+                      </a:pPr>
+                      <a:r>
+                        <a:rPr lang="en-US" sz="3200" kern="1200" dirty="0" smtClean="0">
+                          <a:solidFill>
+                            <a:schemeClr val="dk1"/>
+                          </a:solidFill>
+                          <a:effectLst/>
+                          <a:latin typeface="+mn-lt"/>
+                          <a:ea typeface="+mn-ea"/>
+                          <a:cs typeface="+mn-cs"/>
+                        </a:rPr>
+                        <a:t>Unique random string; used for authentication </a:t>
+                      </a:r>
+                    </a:p>
+                  </a:txBody>
+                  <a:tcPr anchor="ctr"/>
+                </a:tc>
+              </a:tr>
+            </a:tbl>
+          </a:graphicData>
+        </a:graphic>
+      </p:graphicFrame>
+      <p:graphicFrame>
+        <p:nvGraphicFramePr>
+          <p:cNvPr id="21" name="Table 20"/>
+          <p:cNvGraphicFramePr>
+            <a:graphicFrameLocks noGrp="1"/>
+          </p:cNvGraphicFramePr>
+          <p:nvPr>
+            <p:extLst>
+              <p:ext uri="{D42A27DB-BD31-4B8C-83A1-F6EECF244321}">
+                <p14:modId xmlns:p14="http://schemas.microsoft.com/office/powerpoint/2010/main" val="1196307195"/>
+              </p:ext>
+            </p:extLst>
+          </p:nvPr>
+        </p:nvGraphicFramePr>
+        <p:xfrm>
+          <a:off x="30508662" y="13264349"/>
+          <a:ext cx="11891952" cy="4875022"/>
+        </p:xfrm>
+        <a:graphic>
+          <a:graphicData uri="http://schemas.openxmlformats.org/drawingml/2006/table">
+            <a:tbl>
+              <a:tblPr firstRow="1" bandRow="1">
+                <a:tableStyleId>{5C22544A-7EE6-4342-B048-85BDC9FD1C3A}</a:tableStyleId>
+              </a:tblPr>
+              <a:tblGrid>
+                <a:gridCol w="2285922"/>
+                <a:gridCol w="4495800"/>
+                <a:gridCol w="5110230"/>
+              </a:tblGrid>
+              <a:tr h="370840">
+                <a:tc>
+                  <a:txBody>
+                    <a:bodyPr/>
+                    <a:lstStyle/>
+                    <a:p>
+                      <a:pPr algn="ctr"/>
+                      <a:r>
+                        <a:rPr lang="en-US" dirty="0" smtClean="0"/>
+                        <a:t>Name</a:t>
+                      </a:r>
+                      <a:endParaRPr lang="en-US" dirty="0"/>
+                    </a:p>
+                  </a:txBody>
+                  <a:tcPr anchor="ctr"/>
+                </a:tc>
+                <a:tc>
+                  <a:txBody>
+                    <a:bodyPr/>
+                    <a:lstStyle/>
+                    <a:p>
+                      <a:pPr algn="ctr"/>
+                      <a:r>
+                        <a:rPr lang="en-US" dirty="0" smtClean="0"/>
+                        <a:t>Type</a:t>
+                      </a:r>
+                      <a:endParaRPr lang="en-US" dirty="0"/>
+                    </a:p>
+                  </a:txBody>
+                  <a:tcPr anchor="ctr"/>
+                </a:tc>
+                <a:tc>
+                  <a:txBody>
+                    <a:bodyPr/>
+                    <a:lstStyle/>
+                    <a:p>
+                      <a:pPr algn="ctr"/>
+                      <a:r>
+                        <a:rPr lang="en-US" dirty="0" smtClean="0"/>
+                        <a:t>Comment</a:t>
+                      </a:r>
+                      <a:endParaRPr lang="en-US" dirty="0"/>
+                    </a:p>
+                  </a:txBody>
+                  <a:tcPr anchor="ctr"/>
+                </a:tc>
+              </a:tr>
+              <a:tr h="370840">
+                <a:tc>
+                  <a:txBody>
+                    <a:bodyPr/>
+                    <a:lstStyle/>
+                    <a:p>
+                      <a:pPr marL="0" marR="0" indent="0" algn="ctr" defTabSz="1234544" rtl="0" eaLnBrk="1" fontAlgn="auto" latinLnBrk="0" hangingPunct="1">
+                        <a:lnSpc>
+                          <a:spcPct val="100000"/>
+                        </a:lnSpc>
+                        <a:spcBef>
+                          <a:spcPts val="0"/>
+                        </a:spcBef>
+                        <a:spcAft>
+                          <a:spcPts val="0"/>
+                        </a:spcAft>
+                        <a:buClrTx/>
+                        <a:buSzTx/>
+                        <a:buFontTx/>
+                        <a:buNone/>
+                        <a:tabLst/>
+                        <a:defRPr/>
+                      </a:pPr>
+                      <a:r>
+                        <a:rPr lang="en-US" sz="4894" kern="1200" dirty="0" smtClean="0">
+                          <a:solidFill>
+                            <a:schemeClr val="dk1"/>
+                          </a:solidFill>
+                          <a:effectLst/>
+                          <a:latin typeface="+mn-lt"/>
+                          <a:ea typeface="+mn-ea"/>
+                          <a:cs typeface="+mn-cs"/>
+                        </a:rPr>
+                        <a:t>Id</a:t>
+                      </a:r>
+                    </a:p>
+                  </a:txBody>
+                  <a:tcPr anchor="ctr"/>
+                </a:tc>
+                <a:tc>
+                  <a:txBody>
+                    <a:bodyPr/>
+                    <a:lstStyle/>
+                    <a:p>
+                      <a:pPr marL="0" marR="0" indent="0" algn="ctr" defTabSz="1234544" rtl="0" eaLnBrk="1" fontAlgn="auto" latinLnBrk="0" hangingPunct="1">
+                        <a:lnSpc>
+                          <a:spcPct val="100000"/>
+                        </a:lnSpc>
+                        <a:spcBef>
+                          <a:spcPts val="0"/>
+                        </a:spcBef>
+                        <a:spcAft>
+                          <a:spcPts val="0"/>
+                        </a:spcAft>
+                        <a:buClrTx/>
+                        <a:buSzTx/>
+                        <a:buFontTx/>
+                        <a:buNone/>
+                        <a:tabLst/>
+                        <a:defRPr/>
+                      </a:pPr>
+                      <a:r>
+                        <a:rPr lang="en-US" sz="4400" i="1" kern="1200" dirty="0" smtClean="0">
+                          <a:solidFill>
+                            <a:schemeClr val="dk1"/>
+                          </a:solidFill>
+                          <a:effectLst/>
+                          <a:latin typeface="+mn-lt"/>
+                          <a:ea typeface="+mn-ea"/>
+                          <a:cs typeface="+mn-cs"/>
+                        </a:rPr>
+                        <a:t>INT </a:t>
+                      </a:r>
+                      <a:endParaRPr lang="en-US" sz="4400" i="1" dirty="0" smtClean="0"/>
+                    </a:p>
+                  </a:txBody>
+                  <a:tcPr anchor="ctr"/>
+                </a:tc>
+                <a:tc>
+                  <a:txBody>
+                    <a:bodyPr/>
+                    <a:lstStyle/>
+                    <a:p>
+                      <a:pPr marL="0" marR="0" indent="0" algn="ctr" defTabSz="1234544" rtl="0" eaLnBrk="1" fontAlgn="auto" latinLnBrk="0" hangingPunct="1">
+                        <a:lnSpc>
+                          <a:spcPct val="100000"/>
+                        </a:lnSpc>
+                        <a:spcBef>
+                          <a:spcPts val="0"/>
+                        </a:spcBef>
+                        <a:spcAft>
+                          <a:spcPts val="0"/>
+                        </a:spcAft>
+                        <a:buClrTx/>
+                        <a:buSzTx/>
+                        <a:buFontTx/>
+                        <a:buNone/>
+                        <a:tabLst/>
+                        <a:defRPr/>
+                      </a:pPr>
+                      <a:r>
+                        <a:rPr lang="en-US" sz="3200" kern="1200" dirty="0" smtClean="0">
+                          <a:solidFill>
+                            <a:schemeClr val="dk1"/>
+                          </a:solidFill>
+                          <a:effectLst/>
+                          <a:latin typeface="+mn-lt"/>
+                          <a:ea typeface="+mn-ea"/>
+                          <a:cs typeface="+mn-cs"/>
+                        </a:rPr>
+                        <a:t>Unique auto-incremented identifier</a:t>
+                      </a:r>
+                      <a:endParaRPr lang="en-US" sz="3200" dirty="0" smtClean="0"/>
+                    </a:p>
+                  </a:txBody>
+                  <a:tcPr anchor="ctr"/>
+                </a:tc>
+              </a:tr>
+              <a:tr h="370840">
+                <a:tc>
+                  <a:txBody>
+                    <a:bodyPr/>
+                    <a:lstStyle/>
+                    <a:p>
+                      <a:pPr algn="ctr"/>
+                      <a:r>
+                        <a:rPr lang="en-US" sz="4894" kern="1200" dirty="0" smtClean="0">
+                          <a:solidFill>
+                            <a:schemeClr val="dk1"/>
+                          </a:solidFill>
+                          <a:effectLst/>
+                          <a:latin typeface="+mn-lt"/>
+                          <a:ea typeface="+mn-ea"/>
+                          <a:cs typeface="+mn-cs"/>
+                        </a:rPr>
+                        <a:t>Name </a:t>
+                      </a:r>
+                      <a:endParaRPr lang="en-US" dirty="0"/>
+                    </a:p>
+                  </a:txBody>
+                  <a:tcPr anchor="ctr"/>
+                </a:tc>
+                <a:tc>
+                  <a:txBody>
+                    <a:bodyPr/>
+                    <a:lstStyle/>
+                    <a:p>
+                      <a:pPr marL="0" marR="0" indent="0" algn="ctr" defTabSz="1234544" rtl="0" eaLnBrk="1" fontAlgn="auto" latinLnBrk="0" hangingPunct="1">
+                        <a:lnSpc>
+                          <a:spcPct val="100000"/>
+                        </a:lnSpc>
+                        <a:spcBef>
+                          <a:spcPts val="0"/>
+                        </a:spcBef>
+                        <a:spcAft>
+                          <a:spcPts val="0"/>
+                        </a:spcAft>
+                        <a:buClrTx/>
+                        <a:buSzTx/>
+                        <a:buFontTx/>
+                        <a:buNone/>
+                        <a:tabLst/>
+                        <a:defRPr/>
+                      </a:pPr>
+                      <a:r>
+                        <a:rPr lang="en-US" sz="4400" i="1" kern="1200" dirty="0" smtClean="0">
+                          <a:solidFill>
+                            <a:schemeClr val="dk1"/>
+                          </a:solidFill>
+                          <a:effectLst/>
+                          <a:latin typeface="+mn-lt"/>
+                          <a:ea typeface="+mn-ea"/>
+                          <a:cs typeface="+mn-cs"/>
+                        </a:rPr>
+                        <a:t>VARCHAR </a:t>
+                      </a:r>
+                      <a:endParaRPr lang="en-US" sz="4400" i="1" dirty="0" smtClean="0"/>
+                    </a:p>
+                  </a:txBody>
+                  <a:tcPr anchor="ctr"/>
+                </a:tc>
+                <a:tc>
+                  <a:txBody>
+                    <a:bodyPr/>
+                    <a:lstStyle/>
+                    <a:p>
+                      <a:pPr marL="0" marR="0" indent="0" algn="ctr" defTabSz="1234544" rtl="0" eaLnBrk="1" fontAlgn="auto" latinLnBrk="0" hangingPunct="1">
+                        <a:lnSpc>
+                          <a:spcPct val="100000"/>
+                        </a:lnSpc>
+                        <a:spcBef>
+                          <a:spcPts val="0"/>
+                        </a:spcBef>
+                        <a:spcAft>
+                          <a:spcPts val="0"/>
+                        </a:spcAft>
+                        <a:buClrTx/>
+                        <a:buSzTx/>
+                        <a:buFontTx/>
+                        <a:buNone/>
+                        <a:tabLst/>
+                        <a:defRPr/>
+                      </a:pPr>
+                      <a:r>
+                        <a:rPr lang="en-US" sz="3200" kern="1200" dirty="0" smtClean="0">
+                          <a:solidFill>
+                            <a:schemeClr val="dk1"/>
+                          </a:solidFill>
+                          <a:effectLst/>
+                          <a:latin typeface="+mn-lt"/>
+                          <a:ea typeface="+mn-ea"/>
+                          <a:cs typeface="+mn-cs"/>
+                        </a:rPr>
+                        <a:t>User metric’s title</a:t>
+                      </a:r>
+                    </a:p>
+                  </a:txBody>
+                  <a:tcPr anchor="ctr"/>
+                </a:tc>
+              </a:tr>
+              <a:tr h="370840">
+                <a:tc>
+                  <a:txBody>
+                    <a:bodyPr/>
+                    <a:lstStyle/>
+                    <a:p>
+                      <a:pPr marL="0" marR="0" indent="0" algn="ctr" defTabSz="1234544" rtl="0" eaLnBrk="1" fontAlgn="auto" latinLnBrk="0" hangingPunct="1">
+                        <a:lnSpc>
+                          <a:spcPct val="100000"/>
+                        </a:lnSpc>
+                        <a:spcBef>
+                          <a:spcPts val="0"/>
+                        </a:spcBef>
+                        <a:spcAft>
+                          <a:spcPts val="0"/>
+                        </a:spcAft>
+                        <a:buClrTx/>
+                        <a:buSzTx/>
+                        <a:buFontTx/>
+                        <a:buNone/>
+                        <a:tabLst/>
+                        <a:defRPr/>
+                      </a:pPr>
+                      <a:r>
+                        <a:rPr lang="en-US" sz="4894" kern="1200" dirty="0" smtClean="0">
+                          <a:solidFill>
+                            <a:schemeClr val="dk1"/>
+                          </a:solidFill>
+                          <a:effectLst/>
+                          <a:latin typeface="+mn-lt"/>
+                          <a:ea typeface="+mn-ea"/>
+                          <a:cs typeface="+mn-cs"/>
+                        </a:rPr>
+                        <a:t>Value </a:t>
+                      </a:r>
+                      <a:endParaRPr lang="en-US" dirty="0" smtClean="0"/>
+                    </a:p>
+                  </a:txBody>
+                  <a:tcPr anchor="ctr"/>
+                </a:tc>
+                <a:tc>
+                  <a:txBody>
+                    <a:bodyPr/>
+                    <a:lstStyle/>
+                    <a:p>
+                      <a:pPr marL="0" marR="0" indent="0" algn="ctr" defTabSz="1234544" rtl="0" eaLnBrk="1" fontAlgn="auto" latinLnBrk="0" hangingPunct="1">
+                        <a:lnSpc>
+                          <a:spcPct val="100000"/>
+                        </a:lnSpc>
+                        <a:spcBef>
+                          <a:spcPts val="0"/>
+                        </a:spcBef>
+                        <a:spcAft>
+                          <a:spcPts val="0"/>
+                        </a:spcAft>
+                        <a:buClrTx/>
+                        <a:buSzTx/>
+                        <a:buFontTx/>
+                        <a:buNone/>
+                        <a:tabLst/>
+                        <a:defRPr/>
+                      </a:pPr>
+                      <a:r>
+                        <a:rPr lang="en-US" sz="4400" i="1" kern="1200" dirty="0" smtClean="0">
+                          <a:solidFill>
+                            <a:schemeClr val="dk1"/>
+                          </a:solidFill>
+                          <a:effectLst/>
+                          <a:latin typeface="+mn-lt"/>
+                          <a:ea typeface="+mn-ea"/>
+                          <a:cs typeface="+mn-cs"/>
+                        </a:rPr>
+                        <a:t>TEXT </a:t>
+                      </a:r>
+                      <a:r>
+                        <a:rPr lang="is-IS" sz="4400" i="1" kern="1200" dirty="0" smtClean="0">
+                          <a:solidFill>
+                            <a:schemeClr val="dk1"/>
+                          </a:solidFill>
+                          <a:effectLst/>
+                          <a:latin typeface="+mn-lt"/>
+                          <a:ea typeface="+mn-ea"/>
+                          <a:cs typeface="+mn-cs"/>
+                        </a:rPr>
+                        <a:t> </a:t>
+                      </a:r>
+                      <a:endParaRPr lang="is-IS" sz="4400" i="1" dirty="0" smtClean="0"/>
+                    </a:p>
+                  </a:txBody>
+                  <a:tcPr anchor="ctr"/>
+                </a:tc>
+                <a:tc>
+                  <a:txBody>
+                    <a:bodyPr/>
+                    <a:lstStyle/>
+                    <a:p>
+                      <a:pPr marL="0" marR="0" indent="0" algn="ctr" defTabSz="1234544" rtl="0" eaLnBrk="1" fontAlgn="auto" latinLnBrk="0" hangingPunct="1">
+                        <a:lnSpc>
+                          <a:spcPct val="100000"/>
+                        </a:lnSpc>
+                        <a:spcBef>
+                          <a:spcPts val="0"/>
+                        </a:spcBef>
+                        <a:spcAft>
+                          <a:spcPts val="0"/>
+                        </a:spcAft>
+                        <a:buClrTx/>
+                        <a:buSzTx/>
+                        <a:buFontTx/>
+                        <a:buNone/>
+                        <a:tabLst/>
+                        <a:defRPr/>
+                      </a:pPr>
+                      <a:r>
+                        <a:rPr lang="en-US" sz="3200" kern="1200" dirty="0" smtClean="0">
+                          <a:solidFill>
+                            <a:schemeClr val="dk1"/>
+                          </a:solidFill>
+                          <a:effectLst/>
+                          <a:latin typeface="+mn-lt"/>
+                          <a:ea typeface="+mn-ea"/>
+                          <a:cs typeface="+mn-cs"/>
+                        </a:rPr>
+                        <a:t>JSON formatted list of metric id - coefficient</a:t>
+                      </a:r>
+                    </a:p>
+                  </a:txBody>
+                  <a:tcPr anchor="ctr"/>
+                </a:tc>
+              </a:tr>
+              <a:tr h="370840">
+                <a:tc>
+                  <a:txBody>
+                    <a:bodyPr/>
+                    <a:lstStyle/>
+                    <a:p>
+                      <a:pPr marL="0" marR="0" indent="0" algn="ctr" defTabSz="1234544" rtl="0" eaLnBrk="1" fontAlgn="auto" latinLnBrk="0" hangingPunct="1">
+                        <a:lnSpc>
+                          <a:spcPct val="100000"/>
+                        </a:lnSpc>
+                        <a:spcBef>
+                          <a:spcPts val="0"/>
+                        </a:spcBef>
+                        <a:spcAft>
+                          <a:spcPts val="0"/>
+                        </a:spcAft>
+                        <a:buClrTx/>
+                        <a:buSzTx/>
+                        <a:buFontTx/>
+                        <a:buNone/>
+                        <a:tabLst/>
+                        <a:defRPr/>
+                      </a:pPr>
+                      <a:r>
+                        <a:rPr lang="en-US" sz="4894" kern="1200" dirty="0" err="1" smtClean="0">
+                          <a:solidFill>
+                            <a:schemeClr val="dk1"/>
+                          </a:solidFill>
+                          <a:effectLst/>
+                          <a:latin typeface="+mn-lt"/>
+                          <a:ea typeface="+mn-ea"/>
+                          <a:cs typeface="+mn-cs"/>
+                        </a:rPr>
+                        <a:t>UserID</a:t>
+                      </a:r>
+                      <a:r>
+                        <a:rPr lang="en-US" sz="4894" kern="1200" dirty="0" smtClean="0">
+                          <a:solidFill>
+                            <a:schemeClr val="dk1"/>
+                          </a:solidFill>
+                          <a:effectLst/>
+                          <a:latin typeface="+mn-lt"/>
+                          <a:ea typeface="+mn-ea"/>
+                          <a:cs typeface="+mn-cs"/>
+                        </a:rPr>
+                        <a:t> </a:t>
+                      </a:r>
+                      <a:endParaRPr lang="en-US" dirty="0" smtClean="0"/>
+                    </a:p>
+                  </a:txBody>
+                  <a:tcPr anchor="ctr"/>
+                </a:tc>
+                <a:tc>
+                  <a:txBody>
+                    <a:bodyPr/>
+                    <a:lstStyle/>
+                    <a:p>
+                      <a:pPr marL="0" marR="0" indent="0" algn="ctr" defTabSz="1234544" rtl="0" eaLnBrk="1" fontAlgn="auto" latinLnBrk="0" hangingPunct="1">
+                        <a:lnSpc>
+                          <a:spcPct val="100000"/>
+                        </a:lnSpc>
+                        <a:spcBef>
+                          <a:spcPts val="0"/>
+                        </a:spcBef>
+                        <a:spcAft>
+                          <a:spcPts val="0"/>
+                        </a:spcAft>
+                        <a:buClrTx/>
+                        <a:buSzTx/>
+                        <a:buFontTx/>
+                        <a:buNone/>
+                        <a:tabLst/>
+                        <a:defRPr/>
+                      </a:pPr>
+                      <a:r>
+                        <a:rPr lang="en-US" sz="4400" i="1" dirty="0" smtClean="0"/>
+                        <a:t>INT </a:t>
+                      </a:r>
+                    </a:p>
+                  </a:txBody>
+                  <a:tcPr anchor="ctr"/>
+                </a:tc>
+                <a:tc>
+                  <a:txBody>
+                    <a:bodyPr/>
+                    <a:lstStyle/>
+                    <a:p>
+                      <a:pPr marL="0" marR="0" indent="0" algn="ctr" defTabSz="1234544" rtl="0" eaLnBrk="1" fontAlgn="auto" latinLnBrk="0" hangingPunct="1">
+                        <a:lnSpc>
+                          <a:spcPct val="100000"/>
+                        </a:lnSpc>
+                        <a:spcBef>
+                          <a:spcPts val="0"/>
+                        </a:spcBef>
+                        <a:spcAft>
+                          <a:spcPts val="0"/>
+                        </a:spcAft>
+                        <a:buClrTx/>
+                        <a:buSzTx/>
+                        <a:buFontTx/>
+                        <a:buNone/>
+                        <a:tabLst/>
+                        <a:defRPr/>
+                      </a:pPr>
+                      <a:r>
+                        <a:rPr lang="en-US" sz="3200" kern="1200" dirty="0" smtClean="0">
+                          <a:solidFill>
+                            <a:schemeClr val="dk1"/>
+                          </a:solidFill>
+                          <a:effectLst/>
+                          <a:latin typeface="+mn-lt"/>
+                          <a:ea typeface="+mn-ea"/>
+                          <a:cs typeface="+mn-cs"/>
+                        </a:rPr>
+                        <a:t>Id of a user - author of the user metric (foreign key)</a:t>
+                      </a:r>
+                    </a:p>
+                  </a:txBody>
+                  <a:tcPr anchor="ctr"/>
+                </a:tc>
+              </a:tr>
+            </a:tbl>
+          </a:graphicData>
+        </a:graphic>
+      </p:graphicFrame>
       <p:sp>
         <p:nvSpPr>
           <p:cNvPr id="4" name="TextBox 3"/>
@@ -2519,8 +3476,8 @@
         </p:nvSpPr>
         <p:spPr>
           <a:xfrm>
-            <a:off x="17497836" y="5181600"/>
-            <a:ext cx="9572213" cy="4524315"/>
+            <a:off x="2159540" y="19786060"/>
+            <a:ext cx="10797703" cy="3170099"/>
           </a:xfrm>
           <a:prstGeom prst="rect">
             <a:avLst/>
@@ -2534,101 +3491,704 @@
           <a:lstStyle/>
           <a:p>
             <a:r>
-              <a:rPr lang="en-US" sz="2400" b="1" dirty="0" smtClean="0"/>
-              <a:t>The </a:t>
-            </a:r>
-            <a:r>
-              <a:rPr lang="en-US" sz="2400" b="1" dirty="0"/>
-              <a:t>goal of this project was to expand the functionality of the </a:t>
-            </a:r>
-            <a:r>
-              <a:rPr lang="en-US" sz="2400" b="1" dirty="0" err="1" smtClean="0"/>
-              <a:t>MassachusettsTechnology</a:t>
-            </a:r>
-            <a:r>
-              <a:rPr lang="en-US" sz="2400" b="1" dirty="0"/>
-              <a:t>, Talent, and Economic Reporting System (MATTERS) for the </a:t>
-            </a:r>
-            <a:r>
-              <a:rPr lang="en-US" sz="2400" b="1" dirty="0" smtClean="0"/>
-              <a:t>Massachusetts </a:t>
-            </a:r>
-            <a:r>
-              <a:rPr lang="en-US" sz="2400" b="1" dirty="0"/>
-              <a:t>High Technology Council (MHTC), a </a:t>
-            </a:r>
-            <a:r>
-              <a:rPr lang="en-US" sz="2400" b="1" dirty="0" err="1"/>
-              <a:t>protechnology</a:t>
-            </a:r>
-            <a:r>
-              <a:rPr lang="en-US" sz="2400" b="1" dirty="0"/>
-              <a:t> advocacy </a:t>
-            </a:r>
-            <a:r>
-              <a:rPr lang="en-US" sz="2400" b="1" dirty="0" smtClean="0"/>
-              <a:t>and lobbyist </a:t>
-            </a:r>
-            <a:r>
-              <a:rPr lang="en-US" sz="2400" b="1" dirty="0"/>
-              <a:t>organization, through the addition of two new features an Application Program </a:t>
-            </a:r>
-            <a:r>
-              <a:rPr lang="en-US" sz="2400" b="1" dirty="0" smtClean="0"/>
-              <a:t>Interface (API</a:t>
-            </a:r>
-            <a:r>
-              <a:rPr lang="en-US" sz="2400" b="1" dirty="0"/>
-              <a:t>) and the Metric Builder. This API defines a </a:t>
-            </a:r>
-            <a:r>
-              <a:rPr lang="en-US" sz="2400" b="1" dirty="0" smtClean="0"/>
-              <a:t>communication protocol </a:t>
-            </a:r>
-            <a:r>
-              <a:rPr lang="en-US" sz="2400" b="1" dirty="0"/>
-              <a:t>between </a:t>
-            </a:r>
-            <a:r>
-              <a:rPr lang="en-US" sz="2400" b="1" dirty="0" smtClean="0"/>
-              <a:t>MATTERS and </a:t>
-            </a:r>
-            <a:r>
-              <a:rPr lang="en-US" sz="2400" b="1" dirty="0"/>
-              <a:t>other computational-based systems. We also wrote extensive API </a:t>
-            </a:r>
-            <a:r>
-              <a:rPr lang="en-US" sz="2400" b="1" dirty="0" smtClean="0"/>
-              <a:t>documentation</a:t>
-            </a:r>
-            <a:r>
-              <a:rPr lang="en-US" sz="2400" b="1" dirty="0"/>
-              <a:t>. The Metric Builder is a tool that lets users create their own metrics </a:t>
-            </a:r>
-            <a:r>
-              <a:rPr lang="en-US" sz="2400" b="1" dirty="0" smtClean="0"/>
-              <a:t>with their </a:t>
-            </a:r>
-            <a:r>
-              <a:rPr lang="en-US" sz="2400" b="1" dirty="0"/>
-              <a:t>own rules out of existing MATTERS metrics. Users are now able to define </a:t>
-            </a:r>
-            <a:r>
-              <a:rPr lang="en-US" sz="2400" b="1" dirty="0" smtClean="0"/>
-              <a:t>their own </a:t>
-            </a:r>
-            <a:r>
-              <a:rPr lang="en-US" sz="2400" b="1" dirty="0"/>
-              <a:t>indexes and track individual states' performance</a:t>
-            </a:r>
-            <a:r>
-              <a:rPr lang="en-US" sz="2400" b="1" dirty="0" smtClean="0"/>
-              <a:t>.</a:t>
-            </a:r>
-            <a:endParaRPr lang="en-US" sz="2400" b="1" dirty="0"/>
+              <a:rPr lang="en-US" sz="4000" dirty="0">
+                <a:solidFill>
+                  <a:srgbClr val="00B0F0"/>
+                </a:solidFill>
+                <a:latin typeface="Courier New" charset="0"/>
+                <a:ea typeface="Courier New" charset="0"/>
+                <a:cs typeface="Courier New" charset="0"/>
+              </a:rPr>
+              <a:t>/</a:t>
+            </a:r>
+            <a:r>
+              <a:rPr lang="en-US" sz="4000" dirty="0" err="1">
+                <a:solidFill>
+                  <a:srgbClr val="00B0F0"/>
+                </a:solidFill>
+                <a:latin typeface="Courier New" charset="0"/>
+                <a:ea typeface="Courier New" charset="0"/>
+                <a:cs typeface="Courier New" charset="0"/>
+              </a:rPr>
+              <a:t>api</a:t>
+            </a:r>
+            <a:r>
+              <a:rPr lang="en-US" sz="4000" dirty="0">
+                <a:solidFill>
+                  <a:srgbClr val="00B0F0"/>
+                </a:solidFill>
+                <a:latin typeface="Courier New" charset="0"/>
+                <a:ea typeface="Courier New" charset="0"/>
+                <a:cs typeface="Courier New" charset="0"/>
+              </a:rPr>
+              <a:t>/</a:t>
+            </a:r>
+            <a:r>
+              <a:rPr lang="en-US" sz="4000" dirty="0" err="1">
+                <a:solidFill>
+                  <a:srgbClr val="00B0F0"/>
+                </a:solidFill>
+                <a:latin typeface="Courier New" charset="0"/>
+                <a:ea typeface="Courier New" charset="0"/>
+                <a:cs typeface="Courier New" charset="0"/>
+              </a:rPr>
+              <a:t>data</a:t>
+            </a:r>
+            <a:r>
+              <a:rPr lang="en-US" sz="4000" dirty="0" err="1">
+                <a:latin typeface="Courier New" charset="0"/>
+                <a:ea typeface="Courier New" charset="0"/>
+                <a:cs typeface="Courier New" charset="0"/>
+              </a:rPr>
+              <a:t>?</a:t>
+            </a:r>
+            <a:r>
+              <a:rPr lang="en-US" sz="4000" dirty="0" err="1">
+                <a:solidFill>
+                  <a:srgbClr val="C00000"/>
+                </a:solidFill>
+                <a:latin typeface="Courier New" charset="0"/>
+                <a:ea typeface="Courier New" charset="0"/>
+                <a:cs typeface="Courier New" charset="0"/>
+              </a:rPr>
+              <a:t>metric</a:t>
+            </a:r>
+            <a:r>
+              <a:rPr lang="en-US" sz="4000" dirty="0">
+                <a:latin typeface="Courier New" charset="0"/>
+                <a:ea typeface="Courier New" charset="0"/>
+                <a:cs typeface="Courier New" charset="0"/>
+              </a:rPr>
+              <a:t>=</a:t>
+            </a:r>
+            <a:r>
+              <a:rPr lang="en-US" sz="4000" b="1" dirty="0">
+                <a:solidFill>
+                  <a:srgbClr val="7030A0"/>
+                </a:solidFill>
+                <a:latin typeface="Courier New" charset="0"/>
+                <a:ea typeface="Courier New" charset="0"/>
+                <a:cs typeface="Courier New" charset="0"/>
+              </a:rPr>
+              <a:t>{16,32}</a:t>
+            </a:r>
+            <a:r>
+              <a:rPr lang="en-US" sz="4000" dirty="0">
+                <a:latin typeface="Courier New" charset="0"/>
+                <a:ea typeface="Courier New" charset="0"/>
+                <a:cs typeface="Courier New" charset="0"/>
+              </a:rPr>
+              <a:t>&amp;</a:t>
+            </a:r>
+            <a:r>
+              <a:rPr lang="en-US" sz="4000" dirty="0">
+                <a:solidFill>
+                  <a:srgbClr val="C00000"/>
+                </a:solidFill>
+                <a:latin typeface="Courier New" charset="0"/>
+                <a:ea typeface="Courier New" charset="0"/>
+                <a:cs typeface="Courier New" charset="0"/>
+              </a:rPr>
+              <a:t>state</a:t>
+            </a:r>
+            <a:r>
+              <a:rPr lang="en-US" sz="4000" dirty="0">
+                <a:latin typeface="Courier New" charset="0"/>
+                <a:ea typeface="Courier New" charset="0"/>
+                <a:cs typeface="Courier New" charset="0"/>
+              </a:rPr>
+              <a:t>=</a:t>
+            </a:r>
+            <a:r>
+              <a:rPr lang="en-US" sz="4000" b="1" dirty="0" err="1">
+                <a:solidFill>
+                  <a:srgbClr val="7030A0"/>
+                </a:solidFill>
+                <a:latin typeface="Courier New" charset="0"/>
+                <a:ea typeface="Courier New" charset="0"/>
+                <a:cs typeface="Courier New" charset="0"/>
+              </a:rPr>
+              <a:t>MA</a:t>
+            </a:r>
+            <a:r>
+              <a:rPr lang="en-US" sz="4000" dirty="0" err="1">
+                <a:latin typeface="Courier New" charset="0"/>
+                <a:ea typeface="Courier New" charset="0"/>
+                <a:cs typeface="Courier New" charset="0"/>
+              </a:rPr>
+              <a:t>&amp;</a:t>
+            </a:r>
+            <a:r>
+              <a:rPr lang="en-US" sz="4000" dirty="0" err="1">
+                <a:solidFill>
+                  <a:srgbClr val="C00000"/>
+                </a:solidFill>
+                <a:latin typeface="Courier New" charset="0"/>
+                <a:ea typeface="Courier New" charset="0"/>
+                <a:cs typeface="Courier New" charset="0"/>
+              </a:rPr>
+              <a:t>year</a:t>
+            </a:r>
+            <a:r>
+              <a:rPr lang="en-US" sz="4000" dirty="0">
+                <a:latin typeface="Courier New" charset="0"/>
+                <a:ea typeface="Courier New" charset="0"/>
+                <a:cs typeface="Courier New" charset="0"/>
+              </a:rPr>
+              <a:t>=</a:t>
+            </a:r>
+            <a:r>
+              <a:rPr lang="en-US" sz="4000" b="1" dirty="0">
+                <a:solidFill>
+                  <a:srgbClr val="7030A0"/>
+                </a:solidFill>
+                <a:latin typeface="Courier New" charset="0"/>
+                <a:ea typeface="Courier New" charset="0"/>
+                <a:cs typeface="Courier New" charset="0"/>
+              </a:rPr>
+              <a:t>∗</a:t>
+            </a:r>
+            <a:r>
+              <a:rPr lang="en-US" sz="4000" dirty="0">
+                <a:latin typeface="Courier New" charset="0"/>
+                <a:ea typeface="Courier New" charset="0"/>
+                <a:cs typeface="Courier New" charset="0"/>
+              </a:rPr>
+              <a:t>&amp;</a:t>
+            </a:r>
+            <a:r>
+              <a:rPr lang="en-US" sz="4000" dirty="0" err="1">
+                <a:solidFill>
+                  <a:srgbClr val="C00000"/>
+                </a:solidFill>
+                <a:latin typeface="Courier New" charset="0"/>
+                <a:ea typeface="Courier New" charset="0"/>
+                <a:cs typeface="Courier New" charset="0"/>
+              </a:rPr>
+              <a:t>a</a:t>
+            </a:r>
+            <a:r>
+              <a:rPr lang="en-US" sz="4000" dirty="0" err="1">
+                <a:solidFill>
+                  <a:srgbClr val="C00000"/>
+                </a:solidFill>
+                <a:latin typeface="Courier New" charset="0"/>
+                <a:ea typeface="Courier New" charset="0"/>
+                <a:cs typeface="Courier New" charset="0"/>
+              </a:rPr>
+              <a:t>piKey</a:t>
+            </a:r>
+            <a:r>
+              <a:rPr lang="en-US" sz="4000" dirty="0" smtClean="0">
+                <a:latin typeface="Courier New" charset="0"/>
+                <a:ea typeface="Courier New" charset="0"/>
+                <a:cs typeface="Courier New" charset="0"/>
+              </a:rPr>
+              <a:t>=</a:t>
+            </a:r>
+            <a:r>
+              <a:rPr lang="en-US" sz="4000" b="1" dirty="0">
+                <a:solidFill>
+                  <a:srgbClr val="7030A0"/>
+                </a:solidFill>
+                <a:latin typeface="Courier New" charset="0"/>
+                <a:ea typeface="Courier New" charset="0"/>
+                <a:cs typeface="Courier New" charset="0"/>
+              </a:rPr>
+              <a:t>key</a:t>
+            </a:r>
+          </a:p>
+          <a:p>
+            <a:endParaRPr lang="en-US" sz="4000" dirty="0">
+              <a:latin typeface="Courier New" charset="0"/>
+              <a:ea typeface="Courier New" charset="0"/>
+              <a:cs typeface="Courier New" charset="0"/>
+            </a:endParaRPr>
+          </a:p>
+          <a:p>
+            <a:r>
+              <a:rPr lang="en-US" sz="4000" dirty="0">
+                <a:solidFill>
+                  <a:srgbClr val="00B0F0"/>
+                </a:solidFill>
+                <a:latin typeface="Courier New" charset="0"/>
+                <a:ea typeface="Courier New" charset="0"/>
+                <a:cs typeface="Courier New" charset="0"/>
+              </a:rPr>
+              <a:t>/</a:t>
+            </a:r>
+            <a:r>
+              <a:rPr lang="en-US" sz="4000" dirty="0" err="1">
+                <a:solidFill>
+                  <a:srgbClr val="00B0F0"/>
+                </a:solidFill>
+                <a:latin typeface="Courier New" charset="0"/>
+                <a:ea typeface="Courier New" charset="0"/>
+                <a:cs typeface="Courier New" charset="0"/>
+              </a:rPr>
+              <a:t>api</a:t>
+            </a:r>
+            <a:r>
+              <a:rPr lang="en-US" sz="4000" dirty="0">
+                <a:solidFill>
+                  <a:srgbClr val="00B0F0"/>
+                </a:solidFill>
+                <a:latin typeface="Courier New" charset="0"/>
+                <a:ea typeface="Courier New" charset="0"/>
+                <a:cs typeface="Courier New" charset="0"/>
+              </a:rPr>
+              <a:t>/</a:t>
+            </a:r>
+            <a:r>
+              <a:rPr lang="en-US" sz="4000" dirty="0" err="1">
+                <a:solidFill>
+                  <a:srgbClr val="00B0F0"/>
+                </a:solidFill>
+                <a:latin typeface="Courier New" charset="0"/>
+                <a:ea typeface="Courier New" charset="0"/>
+                <a:cs typeface="Courier New" charset="0"/>
+              </a:rPr>
+              <a:t>metrics</a:t>
+            </a:r>
+            <a:r>
+              <a:rPr lang="en-US" sz="4000" dirty="0" err="1">
+                <a:latin typeface="Courier New" charset="0"/>
+                <a:ea typeface="Courier New" charset="0"/>
+                <a:cs typeface="Courier New" charset="0"/>
+              </a:rPr>
+              <a:t>?</a:t>
+            </a:r>
+            <a:r>
+              <a:rPr lang="en-US" sz="4000" dirty="0" err="1">
+                <a:solidFill>
+                  <a:srgbClr val="C00000"/>
+                </a:solidFill>
+                <a:latin typeface="Courier New" charset="0"/>
+                <a:ea typeface="Courier New" charset="0"/>
+                <a:cs typeface="Courier New" charset="0"/>
+              </a:rPr>
+              <a:t>apiKey</a:t>
+            </a:r>
+            <a:r>
+              <a:rPr lang="en-US" sz="4000" dirty="0">
+                <a:latin typeface="Courier New" charset="0"/>
+                <a:ea typeface="Courier New" charset="0"/>
+                <a:cs typeface="Courier New" charset="0"/>
+              </a:rPr>
+              <a:t>=</a:t>
+            </a:r>
+            <a:r>
+              <a:rPr lang="en-US" sz="4000" b="1" dirty="0">
+                <a:solidFill>
+                  <a:srgbClr val="7030A0"/>
+                </a:solidFill>
+                <a:latin typeface="Courier New" charset="0"/>
+                <a:ea typeface="Courier New" charset="0"/>
+                <a:cs typeface="Courier New" charset="0"/>
+              </a:rPr>
+              <a:t>key</a:t>
+            </a:r>
+            <a:r>
+              <a:rPr lang="en-US" sz="4000" dirty="0">
+                <a:latin typeface="Courier New" charset="0"/>
+                <a:ea typeface="Courier New" charset="0"/>
+                <a:cs typeface="Courier New" charset="0"/>
+              </a:rPr>
+              <a:t> </a:t>
+            </a:r>
+            <a:endParaRPr lang="en-US" sz="4000" dirty="0">
+              <a:latin typeface="Courier New" charset="0"/>
+              <a:ea typeface="Courier New" charset="0"/>
+              <a:cs typeface="Courier New" charset="0"/>
+            </a:endParaRPr>
+          </a:p>
+          <a:p>
+            <a:r>
+              <a:rPr lang="en-US" sz="4000" dirty="0">
+                <a:solidFill>
+                  <a:srgbClr val="00B0F0"/>
+                </a:solidFill>
+                <a:latin typeface="Courier New" charset="0"/>
+                <a:ea typeface="Courier New" charset="0"/>
+                <a:cs typeface="Courier New" charset="0"/>
+              </a:rPr>
+              <a:t>/</a:t>
+            </a:r>
+            <a:r>
+              <a:rPr lang="en-US" sz="4000" dirty="0" err="1">
+                <a:solidFill>
+                  <a:srgbClr val="00B0F0"/>
+                </a:solidFill>
+                <a:latin typeface="Courier New" charset="0"/>
+                <a:ea typeface="Courier New" charset="0"/>
+                <a:cs typeface="Courier New" charset="0"/>
+              </a:rPr>
+              <a:t>api</a:t>
+            </a:r>
+            <a:r>
+              <a:rPr lang="en-US" sz="4000" dirty="0">
+                <a:solidFill>
+                  <a:srgbClr val="00B0F0"/>
+                </a:solidFill>
+                <a:latin typeface="Courier New" charset="0"/>
+                <a:ea typeface="Courier New" charset="0"/>
+                <a:cs typeface="Courier New" charset="0"/>
+              </a:rPr>
+              <a:t>/</a:t>
+            </a:r>
+            <a:r>
+              <a:rPr lang="en-US" sz="4000" dirty="0" err="1">
+                <a:solidFill>
+                  <a:srgbClr val="00B0F0"/>
+                </a:solidFill>
+                <a:latin typeface="Courier New" charset="0"/>
+                <a:ea typeface="Courier New" charset="0"/>
+                <a:cs typeface="Courier New" charset="0"/>
+              </a:rPr>
+              <a:t>states</a:t>
+            </a:r>
+            <a:r>
+              <a:rPr lang="en-US" sz="4000" dirty="0" err="1">
+                <a:latin typeface="Courier New" charset="0"/>
+                <a:ea typeface="Courier New" charset="0"/>
+                <a:cs typeface="Courier New" charset="0"/>
+              </a:rPr>
+              <a:t>?</a:t>
+            </a:r>
+            <a:r>
+              <a:rPr lang="en-US" sz="4000" dirty="0" err="1">
+                <a:solidFill>
+                  <a:srgbClr val="C00000"/>
+                </a:solidFill>
+                <a:latin typeface="Courier New" charset="0"/>
+                <a:ea typeface="Courier New" charset="0"/>
+                <a:cs typeface="Courier New" charset="0"/>
+              </a:rPr>
+              <a:t>apiKey</a:t>
+            </a:r>
+            <a:r>
+              <a:rPr lang="en-US" sz="4000" dirty="0">
+                <a:latin typeface="Courier New" charset="0"/>
+                <a:ea typeface="Courier New" charset="0"/>
+                <a:cs typeface="Courier New" charset="0"/>
+              </a:rPr>
+              <a:t>=</a:t>
+            </a:r>
+            <a:r>
+              <a:rPr lang="en-US" sz="4000" b="1" dirty="0">
+                <a:solidFill>
+                  <a:srgbClr val="7030A0"/>
+                </a:solidFill>
+                <a:latin typeface="Courier New" charset="0"/>
+                <a:ea typeface="Courier New" charset="0"/>
+                <a:cs typeface="Courier New" charset="0"/>
+              </a:rPr>
+              <a:t>key</a:t>
+            </a:r>
+            <a:r>
+              <a:rPr lang="en-US" sz="4000" dirty="0">
+                <a:latin typeface="Courier New" charset="0"/>
+                <a:ea typeface="Courier New" charset="0"/>
+                <a:cs typeface="Courier New" charset="0"/>
+              </a:rPr>
+              <a:t> </a:t>
+            </a:r>
+            <a:endParaRPr lang="en-US" sz="4000" dirty="0">
+              <a:latin typeface="Courier New" charset="0"/>
+              <a:ea typeface="Courier New" charset="0"/>
+              <a:cs typeface="Courier New" charset="0"/>
+            </a:endParaRPr>
           </a:p>
         </p:txBody>
       </p:sp>
+      <p:sp>
+        <p:nvSpPr>
+          <p:cNvPr id="5" name="TextBox 4"/>
+          <p:cNvSpPr txBox="1"/>
+          <p:nvPr/>
+        </p:nvSpPr>
+        <p:spPr>
+          <a:xfrm>
+            <a:off x="15938194" y="5389135"/>
+            <a:ext cx="12014811" cy="4401205"/>
+          </a:xfrm>
+          <a:prstGeom prst="rect">
+            <a:avLst/>
+          </a:prstGeom>
+          <a:noFill/>
+        </p:spPr>
+        <p:txBody>
+          <a:bodyPr wrap="square" rtlCol="0">
+            <a:spAutoFit/>
+          </a:bodyPr>
+          <a:lstStyle/>
+          <a:p>
+            <a:pPr algn="just"/>
+            <a:r>
+              <a:rPr lang="en-US" sz="2800" dirty="0"/>
+              <a:t>The goal of this project was to expand the functionality of the Massachusetts Technology, Talent, and Economic Reporting System (MATTERS) for the Massachusetts High </a:t>
+            </a:r>
+            <a:r>
+              <a:rPr lang="en-US" sz="2800" dirty="0" smtClean="0"/>
+              <a:t>Technology </a:t>
+            </a:r>
+            <a:r>
+              <a:rPr lang="en-US" sz="2800" dirty="0"/>
+              <a:t>Council (MHTC), a </a:t>
+            </a:r>
+            <a:r>
+              <a:rPr lang="en-US" sz="2800" dirty="0" err="1"/>
+              <a:t>protechnology</a:t>
+            </a:r>
+            <a:r>
+              <a:rPr lang="en-US" sz="2800" dirty="0"/>
+              <a:t> advocacy and lobbyist organization, with two new features - Application Program Interface (API) and Metric Builder. API defines a </a:t>
+            </a:r>
+            <a:r>
+              <a:rPr lang="en-US" sz="2800" dirty="0" smtClean="0"/>
+              <a:t>communication </a:t>
+            </a:r>
+            <a:r>
+              <a:rPr lang="en-US" sz="2800" dirty="0"/>
+              <a:t>protocol between MATTERS and other computational-based systems. We also wrote an extensive API documentation. Metric Builder is a tool that lets users create own metrics with own rules out of existing MATTERS metrics. Users are now able to define their own indexes and track individual states’ performance. </a:t>
+            </a:r>
+            <a:endParaRPr lang="en-US" sz="2800" dirty="0"/>
+          </a:p>
+        </p:txBody>
+      </p:sp>
+      <mc:AlternateContent xmlns:mc="http://schemas.openxmlformats.org/markup-compatibility/2006">
+        <mc:Choice xmlns:a14="http://schemas.microsoft.com/office/drawing/2010/main" Requires="a14">
+          <p:sp>
+            <p:nvSpPr>
+              <p:cNvPr id="6" name="TextBox 5"/>
+              <p:cNvSpPr txBox="1"/>
+              <p:nvPr/>
+            </p:nvSpPr>
+            <p:spPr>
+              <a:xfrm>
+                <a:off x="32016724" y="27265622"/>
+                <a:ext cx="8875828" cy="2896627"/>
+              </a:xfrm>
+              <a:prstGeom prst="rect">
+                <a:avLst/>
+              </a:prstGeom>
+              <a:noFill/>
+            </p:spPr>
+            <p:txBody>
+              <a:bodyPr wrap="none" lIns="0" tIns="0" rIns="0" bIns="0" rtlCol="0">
+                <a:spAutoFit/>
+              </a:bodyPr>
+              <a:lstStyle/>
+              <a:p>
+                <a14:m>
+                  <m:oMathPara xmlns:m="http://schemas.openxmlformats.org/officeDocument/2006/math">
+                    <m:oMathParaPr>
+                      <m:jc m:val="centerGroup"/>
+                    </m:oMathParaPr>
+                    <m:oMath xmlns:m="http://schemas.openxmlformats.org/officeDocument/2006/math">
+                      <m:sSub>
+                        <m:sSubPr>
+                          <m:ctrlPr>
+                            <a:rPr lang="en-US" sz="9600" b="0" i="1" smtClean="0">
+                              <a:latin typeface="Cambria Math" charset="0"/>
+                            </a:rPr>
+                          </m:ctrlPr>
+                        </m:sSubPr>
+                        <m:e>
+                          <m:r>
+                            <a:rPr lang="en-US" sz="9600" b="0" i="1" smtClean="0">
+                              <a:latin typeface="Cambria Math" charset="0"/>
+                            </a:rPr>
+                            <m:t>𝑉</m:t>
+                          </m:r>
+                        </m:e>
+                        <m:sub>
+                          <m:r>
+                            <a:rPr lang="en-US" sz="9600" b="0" i="1" smtClean="0">
+                              <a:latin typeface="Cambria Math" charset="0"/>
+                            </a:rPr>
+                            <m:t>𝑦</m:t>
+                          </m:r>
+                        </m:sub>
+                      </m:sSub>
+                      <m:r>
+                        <a:rPr lang="en-US" sz="9600" b="0" i="1" smtClean="0">
+                          <a:latin typeface="Cambria Math" charset="0"/>
+                        </a:rPr>
+                        <m:t>=</m:t>
+                      </m:r>
+                      <m:f>
+                        <m:fPr>
+                          <m:ctrlPr>
+                            <a:rPr lang="bg-BG" sz="9600" b="0" i="1" smtClean="0">
+                              <a:latin typeface="Cambria Math" charset="0"/>
+                            </a:rPr>
+                          </m:ctrlPr>
+                        </m:fPr>
+                        <m:num>
+                          <m:nary>
+                            <m:naryPr>
+                              <m:chr m:val="∑"/>
+                              <m:limLoc m:val="subSup"/>
+                              <m:supHide m:val="on"/>
+                              <m:ctrlPr>
+                                <a:rPr lang="bg-BG" sz="9600" b="0" i="1" smtClean="0">
+                                  <a:latin typeface="Cambria Math" charset="0"/>
+                                </a:rPr>
+                              </m:ctrlPr>
+                            </m:naryPr>
+                            <m:sub>
+                              <m:r>
+                                <m:rPr>
+                                  <m:brk m:alnAt="9"/>
+                                </m:rPr>
+                                <a:rPr lang="en-US" sz="9600" b="0" i="1" smtClean="0">
+                                  <a:latin typeface="Cambria Math" charset="0"/>
+                                </a:rPr>
+                                <m:t>𝑖</m:t>
+                              </m:r>
+                              <m:r>
+                                <a:rPr lang="en-US" sz="9600" b="0" i="1" smtClean="0">
+                                  <a:latin typeface="Cambria Math" charset="0"/>
+                                  <a:ea typeface="Cambria Math" charset="0"/>
+                                  <a:cs typeface="Cambria Math" charset="0"/>
+                                </a:rPr>
+                                <m:t>∈</m:t>
+                              </m:r>
+                              <m:r>
+                                <a:rPr lang="en-US" sz="9600" b="0" i="1" smtClean="0">
+                                  <a:latin typeface="Cambria Math" charset="0"/>
+                                  <a:ea typeface="Cambria Math" charset="0"/>
+                                  <a:cs typeface="Cambria Math" charset="0"/>
+                                </a:rPr>
+                                <m:t>𝐼</m:t>
+                              </m:r>
+                            </m:sub>
+                            <m:sup/>
+                            <m:e>
+                              <m:sSub>
+                                <m:sSubPr>
+                                  <m:ctrlPr>
+                                    <a:rPr lang="en-US" sz="9600" b="0" i="1" smtClean="0">
+                                      <a:latin typeface="Cambria Math" charset="0"/>
+                                    </a:rPr>
+                                  </m:ctrlPr>
+                                </m:sSubPr>
+                                <m:e>
+                                  <m:r>
+                                    <a:rPr lang="en-US" sz="9600" b="0" i="1" smtClean="0">
+                                      <a:latin typeface="Cambria Math" charset="0"/>
+                                    </a:rPr>
+                                    <m:t>𝑣</m:t>
+                                  </m:r>
+                                </m:e>
+                                <m:sub>
+                                  <m:r>
+                                    <a:rPr lang="en-US" sz="9600" b="0" i="1" smtClean="0">
+                                      <a:latin typeface="Cambria Math" charset="0"/>
+                                    </a:rPr>
+                                    <m:t>𝑖𝑦</m:t>
+                                  </m:r>
+                                </m:sub>
+                              </m:sSub>
+                              <m:r>
+                                <a:rPr lang="en-US" sz="9600" b="0" i="1" smtClean="0">
+                                  <a:latin typeface="Cambria Math" charset="0"/>
+                                  <a:ea typeface="Cambria Math" charset="0"/>
+                                  <a:cs typeface="Cambria Math" charset="0"/>
+                                </a:rPr>
+                                <m:t>∙</m:t>
+                              </m:r>
+                              <m:sSub>
+                                <m:sSubPr>
+                                  <m:ctrlPr>
+                                    <a:rPr lang="en-US" sz="9600" b="0" i="1" smtClean="0">
+                                      <a:latin typeface="Cambria Math" charset="0"/>
+                                      <a:ea typeface="Cambria Math" charset="0"/>
+                                      <a:cs typeface="Cambria Math" charset="0"/>
+                                    </a:rPr>
+                                  </m:ctrlPr>
+                                </m:sSubPr>
+                                <m:e>
+                                  <m:r>
+                                    <a:rPr lang="en-US" sz="9600" b="0" i="1" smtClean="0">
+                                      <a:latin typeface="Cambria Math" charset="0"/>
+                                      <a:ea typeface="Cambria Math" charset="0"/>
+                                      <a:cs typeface="Cambria Math" charset="0"/>
+                                    </a:rPr>
+                                    <m:t>𝑐</m:t>
+                                  </m:r>
+                                </m:e>
+                                <m:sub>
+                                  <m:r>
+                                    <a:rPr lang="en-US" sz="9600" b="0" i="1" smtClean="0">
+                                      <a:latin typeface="Cambria Math" charset="0"/>
+                                      <a:ea typeface="Cambria Math" charset="0"/>
+                                      <a:cs typeface="Cambria Math" charset="0"/>
+                                    </a:rPr>
+                                    <m:t>𝑖</m:t>
+                                  </m:r>
+                                </m:sub>
+                              </m:sSub>
+                            </m:e>
+                          </m:nary>
+                        </m:num>
+                        <m:den>
+                          <m:r>
+                            <a:rPr lang="en-US" sz="9600" b="0" i="1" smtClean="0">
+                              <a:latin typeface="Cambria Math" charset="0"/>
+                            </a:rPr>
+                            <m:t>100</m:t>
+                          </m:r>
+                        </m:den>
+                      </m:f>
+                    </m:oMath>
+                  </m:oMathPara>
+                </a14:m>
+                <a:endParaRPr lang="en-US" sz="9600" dirty="0"/>
+              </a:p>
+            </p:txBody>
+          </p:sp>
+        </mc:Choice>
+        <mc:Fallback>
+          <p:sp>
+            <p:nvSpPr>
+              <p:cNvPr id="6" name="TextBox 5"/>
+              <p:cNvSpPr txBox="1">
+                <a:spLocks noRot="1" noChangeAspect="1" noMove="1" noResize="1" noEditPoints="1" noAdjustHandles="1" noChangeArrowheads="1" noChangeShapeType="1" noTextEdit="1"/>
+              </p:cNvSpPr>
+              <p:nvPr/>
+            </p:nvSpPr>
+            <p:spPr>
+              <a:xfrm>
+                <a:off x="32016724" y="27265622"/>
+                <a:ext cx="8875828" cy="2896627"/>
+              </a:xfrm>
+              <a:prstGeom prst="rect">
+                <a:avLst/>
+              </a:prstGeom>
+              <a:blipFill rotWithShape="0">
+                <a:blip r:embed="rId9"/>
+                <a:stretch>
+                  <a:fillRect/>
+                </a:stretch>
+              </a:blipFill>
+            </p:spPr>
+            <p:txBody>
+              <a:bodyPr/>
+              <a:lstStyle/>
+              <a:p>
+                <a:r>
+                  <a:rPr lang="en-US">
+                    <a:noFill/>
+                  </a:rPr>
+                  <a:t> </a:t>
+                </a:r>
+              </a:p>
+            </p:txBody>
+          </p:sp>
+        </mc:Fallback>
+      </mc:AlternateContent>
     </p:spTree>
     <p:extLst>
       <p:ext uri="{BB962C8B-B14F-4D97-AF65-F5344CB8AC3E}">

</xml_diff>